<commit_message>
Fixed Compiler Framework figure.
</commit_message>
<xml_diff>
--- a/overleaf/figs_paper_SIMD/Compiler_Framework.pptx
+++ b/overleaf/figs_paper_SIMD/Compiler_Framework.pptx
@@ -7,8 +7,9 @@
   <p:sldIdLst>
     <p:sldId id="256" r:id="rId2"/>
     <p:sldId id="257" r:id="rId3"/>
-    <p:sldId id="258" r:id="rId4"/>
-    <p:sldId id="259" r:id="rId5"/>
+    <p:sldId id="260" r:id="rId4"/>
+    <p:sldId id="258" r:id="rId5"/>
+    <p:sldId id="259" r:id="rId6"/>
   </p:sldIdLst>
   <p:sldSz cx="9144000" cy="6858000" type="screen4x3"/>
   <p:notesSz cx="6858000" cy="9144000"/>
@@ -291,7 +292,7 @@
           <a:p>
             <a:fld id="{BADA5134-9072-CF40-A046-C2EAE7DC6048}" type="datetimeFigureOut">
               <a:rPr lang="en-US" smtClean="0"/>
-              <a:t>3/27/22</a:t>
+              <a:t>4/30/22</a:t>
             </a:fld>
             <a:endParaRPr lang="en-US"/>
           </a:p>
@@ -461,7 +462,7 @@
           <a:p>
             <a:fld id="{BADA5134-9072-CF40-A046-C2EAE7DC6048}" type="datetimeFigureOut">
               <a:rPr lang="en-US" smtClean="0"/>
-              <a:t>3/27/22</a:t>
+              <a:t>4/30/22</a:t>
             </a:fld>
             <a:endParaRPr lang="en-US"/>
           </a:p>
@@ -641,7 +642,7 @@
           <a:p>
             <a:fld id="{BADA5134-9072-CF40-A046-C2EAE7DC6048}" type="datetimeFigureOut">
               <a:rPr lang="en-US" smtClean="0"/>
-              <a:t>3/27/22</a:t>
+              <a:t>4/30/22</a:t>
             </a:fld>
             <a:endParaRPr lang="en-US"/>
           </a:p>
@@ -811,7 +812,7 @@
           <a:p>
             <a:fld id="{BADA5134-9072-CF40-A046-C2EAE7DC6048}" type="datetimeFigureOut">
               <a:rPr lang="en-US" smtClean="0"/>
-              <a:t>3/27/22</a:t>
+              <a:t>4/30/22</a:t>
             </a:fld>
             <a:endParaRPr lang="en-US"/>
           </a:p>
@@ -1057,7 +1058,7 @@
           <a:p>
             <a:fld id="{BADA5134-9072-CF40-A046-C2EAE7DC6048}" type="datetimeFigureOut">
               <a:rPr lang="en-US" smtClean="0"/>
-              <a:t>3/27/22</a:t>
+              <a:t>4/30/22</a:t>
             </a:fld>
             <a:endParaRPr lang="en-US"/>
           </a:p>
@@ -1345,7 +1346,7 @@
           <a:p>
             <a:fld id="{BADA5134-9072-CF40-A046-C2EAE7DC6048}" type="datetimeFigureOut">
               <a:rPr lang="en-US" smtClean="0"/>
-              <a:t>3/27/22</a:t>
+              <a:t>4/30/22</a:t>
             </a:fld>
             <a:endParaRPr lang="en-US"/>
           </a:p>
@@ -1767,7 +1768,7 @@
           <a:p>
             <a:fld id="{BADA5134-9072-CF40-A046-C2EAE7DC6048}" type="datetimeFigureOut">
               <a:rPr lang="en-US" smtClean="0"/>
-              <a:t>3/27/22</a:t>
+              <a:t>4/30/22</a:t>
             </a:fld>
             <a:endParaRPr lang="en-US"/>
           </a:p>
@@ -1885,7 +1886,7 @@
           <a:p>
             <a:fld id="{BADA5134-9072-CF40-A046-C2EAE7DC6048}" type="datetimeFigureOut">
               <a:rPr lang="en-US" smtClean="0"/>
-              <a:t>3/27/22</a:t>
+              <a:t>4/30/22</a:t>
             </a:fld>
             <a:endParaRPr lang="en-US"/>
           </a:p>
@@ -1980,7 +1981,7 @@
           <a:p>
             <a:fld id="{BADA5134-9072-CF40-A046-C2EAE7DC6048}" type="datetimeFigureOut">
               <a:rPr lang="en-US" smtClean="0"/>
-              <a:t>3/27/22</a:t>
+              <a:t>4/30/22</a:t>
             </a:fld>
             <a:endParaRPr lang="en-US"/>
           </a:p>
@@ -2257,7 +2258,7 @@
           <a:p>
             <a:fld id="{BADA5134-9072-CF40-A046-C2EAE7DC6048}" type="datetimeFigureOut">
               <a:rPr lang="en-US" smtClean="0"/>
-              <a:t>3/27/22</a:t>
+              <a:t>4/30/22</a:t>
             </a:fld>
             <a:endParaRPr lang="en-US"/>
           </a:p>
@@ -2510,7 +2511,7 @@
           <a:p>
             <a:fld id="{BADA5134-9072-CF40-A046-C2EAE7DC6048}" type="datetimeFigureOut">
               <a:rPr lang="en-US" smtClean="0"/>
-              <a:t>3/27/22</a:t>
+              <a:t>4/30/22</a:t>
             </a:fld>
             <a:endParaRPr lang="en-US"/>
           </a:p>
@@ -2723,7 +2724,7 @@
           <a:p>
             <a:fld id="{BADA5134-9072-CF40-A046-C2EAE7DC6048}" type="datetimeFigureOut">
               <a:rPr lang="en-US" smtClean="0"/>
-              <a:t>3/27/22</a:t>
+              <a:t>4/30/22</a:t>
             </a:fld>
             <a:endParaRPr lang="en-US"/>
           </a:p>
@@ -4136,6 +4137,954 @@
         </p:nvSpPr>
         <p:spPr>
           <a:xfrm>
+            <a:off x="346760" y="3004459"/>
+            <a:ext cx="826669" cy="369332"/>
+          </a:xfrm>
+          <a:prstGeom prst="rect">
+            <a:avLst/>
+          </a:prstGeom>
+          <a:noFill/>
+          <a:ln>
+            <a:solidFill>
+              <a:schemeClr val="tx1"/>
+            </a:solidFill>
+          </a:ln>
+        </p:spPr>
+        <p:txBody>
+          <a:bodyPr wrap="none" rtlCol="0">
+            <a:spAutoFit/>
+          </a:bodyPr>
+          <a:lstStyle/>
+          <a:p>
+            <a:r>
+              <a:rPr lang="en-US" dirty="0" smtClean="0"/>
+              <a:t>Source</a:t>
+            </a:r>
+            <a:endParaRPr lang="en-US" dirty="0"/>
+          </a:p>
+        </p:txBody>
+      </p:sp>
+      <p:sp>
+        <p:nvSpPr>
+          <p:cNvPr id="5" name="TextBox 4"/>
+          <p:cNvSpPr txBox="1"/>
+          <p:nvPr/>
+        </p:nvSpPr>
+        <p:spPr>
+          <a:xfrm>
+            <a:off x="2210980" y="3004993"/>
+            <a:ext cx="1528295" cy="369332"/>
+          </a:xfrm>
+          <a:prstGeom prst="rect">
+            <a:avLst/>
+          </a:prstGeom>
+          <a:noFill/>
+          <a:ln>
+            <a:solidFill>
+              <a:schemeClr val="tx1"/>
+            </a:solidFill>
+          </a:ln>
+        </p:spPr>
+        <p:txBody>
+          <a:bodyPr wrap="none" rtlCol="0">
+            <a:spAutoFit/>
+          </a:bodyPr>
+          <a:lstStyle/>
+          <a:p>
+            <a:r>
+              <a:rPr lang="en-US" dirty="0" smtClean="0"/>
+              <a:t>3-address CFG</a:t>
+            </a:r>
+            <a:endParaRPr lang="en-US" dirty="0"/>
+          </a:p>
+        </p:txBody>
+      </p:sp>
+      <p:sp>
+        <p:nvSpPr>
+          <p:cNvPr id="6" name="TextBox 5"/>
+          <p:cNvSpPr txBox="1"/>
+          <p:nvPr/>
+        </p:nvSpPr>
+        <p:spPr>
+          <a:xfrm>
+            <a:off x="4847735" y="3004993"/>
+            <a:ext cx="1075197" cy="369332"/>
+          </a:xfrm>
+          <a:prstGeom prst="rect">
+            <a:avLst/>
+          </a:prstGeom>
+          <a:noFill/>
+          <a:ln>
+            <a:solidFill>
+              <a:schemeClr val="tx1"/>
+            </a:solidFill>
+          </a:ln>
+        </p:spPr>
+        <p:txBody>
+          <a:bodyPr wrap="none" rtlCol="0">
+            <a:spAutoFit/>
+          </a:bodyPr>
+          <a:lstStyle/>
+          <a:p>
+            <a:r>
+              <a:rPr lang="en-US" dirty="0" smtClean="0"/>
+              <a:t>SSA Form</a:t>
+            </a:r>
+            <a:endParaRPr lang="en-US" dirty="0"/>
+          </a:p>
+        </p:txBody>
+      </p:sp>
+      <p:sp>
+        <p:nvSpPr>
+          <p:cNvPr id="7" name="TextBox 6"/>
+          <p:cNvSpPr txBox="1"/>
+          <p:nvPr/>
+        </p:nvSpPr>
+        <p:spPr>
+          <a:xfrm>
+            <a:off x="7236545" y="3005527"/>
+            <a:ext cx="1318540" cy="369332"/>
+          </a:xfrm>
+          <a:prstGeom prst="rect">
+            <a:avLst/>
+          </a:prstGeom>
+          <a:noFill/>
+          <a:ln>
+            <a:solidFill>
+              <a:schemeClr val="tx1"/>
+            </a:solidFill>
+          </a:ln>
+        </p:spPr>
+        <p:txBody>
+          <a:bodyPr wrap="none" rtlCol="0">
+            <a:spAutoFit/>
+          </a:bodyPr>
+          <a:lstStyle/>
+          <a:p>
+            <a:r>
+              <a:rPr lang="en-US" dirty="0" smtClean="0"/>
+              <a:t>MPC Source</a:t>
+            </a:r>
+            <a:endParaRPr lang="en-US" dirty="0"/>
+          </a:p>
+        </p:txBody>
+      </p:sp>
+      <p:sp>
+        <p:nvSpPr>
+          <p:cNvPr id="8" name="TextBox 7"/>
+          <p:cNvSpPr txBox="1"/>
+          <p:nvPr/>
+        </p:nvSpPr>
+        <p:spPr>
+          <a:xfrm>
+            <a:off x="7228566" y="3010038"/>
+            <a:ext cx="1338828" cy="369332"/>
+          </a:xfrm>
+          <a:prstGeom prst="rect">
+            <a:avLst/>
+          </a:prstGeom>
+          <a:noFill/>
+          <a:ln>
+            <a:solidFill>
+              <a:schemeClr val="tx1"/>
+            </a:solidFill>
+          </a:ln>
+        </p:spPr>
+        <p:txBody>
+          <a:bodyPr wrap="none" rtlCol="0">
+            <a:spAutoFit/>
+          </a:bodyPr>
+          <a:lstStyle/>
+          <a:p>
+            <a:r>
+              <a:rPr lang="en-US" b="1" dirty="0" smtClean="0"/>
+              <a:t>MPC Source</a:t>
+            </a:r>
+            <a:endParaRPr lang="en-US" b="1" dirty="0"/>
+          </a:p>
+        </p:txBody>
+      </p:sp>
+      <p:sp>
+        <p:nvSpPr>
+          <p:cNvPr id="9" name="TextBox 8"/>
+          <p:cNvSpPr txBox="1"/>
+          <p:nvPr/>
+        </p:nvSpPr>
+        <p:spPr>
+          <a:xfrm>
+            <a:off x="9845287" y="2886318"/>
+            <a:ext cx="1338828" cy="646331"/>
+          </a:xfrm>
+          <a:prstGeom prst="rect">
+            <a:avLst/>
+          </a:prstGeom>
+          <a:noFill/>
+          <a:ln>
+            <a:solidFill>
+              <a:schemeClr val="tx1"/>
+            </a:solidFill>
+          </a:ln>
+        </p:spPr>
+        <p:txBody>
+          <a:bodyPr wrap="none" rtlCol="0">
+            <a:spAutoFit/>
+          </a:bodyPr>
+          <a:lstStyle/>
+          <a:p>
+            <a:pPr algn="ctr"/>
+            <a:r>
+              <a:rPr lang="en-US" b="1" dirty="0" smtClean="0"/>
+              <a:t>Optimized </a:t>
+            </a:r>
+            <a:br>
+              <a:rPr lang="en-US" b="1" dirty="0" smtClean="0"/>
+            </a:br>
+            <a:r>
+              <a:rPr lang="en-US" b="1" dirty="0" smtClean="0"/>
+              <a:t>MPC Source</a:t>
+            </a:r>
+            <a:endParaRPr lang="en-US" b="1" dirty="0"/>
+          </a:p>
+        </p:txBody>
+      </p:sp>
+      <p:sp>
+        <p:nvSpPr>
+          <p:cNvPr id="10" name="TextBox 9"/>
+          <p:cNvSpPr txBox="1"/>
+          <p:nvPr/>
+        </p:nvSpPr>
+        <p:spPr>
+          <a:xfrm>
+            <a:off x="12782636" y="3024912"/>
+            <a:ext cx="1007345" cy="369332"/>
+          </a:xfrm>
+          <a:prstGeom prst="rect">
+            <a:avLst/>
+          </a:prstGeom>
+          <a:noFill/>
+          <a:ln>
+            <a:solidFill>
+              <a:schemeClr val="tx1"/>
+            </a:solidFill>
+          </a:ln>
+        </p:spPr>
+        <p:txBody>
+          <a:bodyPr wrap="none" rtlCol="0">
+            <a:spAutoFit/>
+          </a:bodyPr>
+          <a:lstStyle/>
+          <a:p>
+            <a:r>
+              <a:rPr lang="en-US" dirty="0" smtClean="0"/>
+              <a:t>MOTION</a:t>
+            </a:r>
+            <a:endParaRPr lang="en-US" dirty="0"/>
+          </a:p>
+        </p:txBody>
+      </p:sp>
+      <p:sp>
+        <p:nvSpPr>
+          <p:cNvPr id="11" name="TextBox 10"/>
+          <p:cNvSpPr txBox="1"/>
+          <p:nvPr/>
+        </p:nvSpPr>
+        <p:spPr>
+          <a:xfrm>
+            <a:off x="691082" y="1932453"/>
+            <a:ext cx="2012728" cy="646331"/>
+          </a:xfrm>
+          <a:prstGeom prst="rect">
+            <a:avLst/>
+          </a:prstGeom>
+          <a:noFill/>
+          <a:ln>
+            <a:solidFill>
+              <a:srgbClr val="008000"/>
+            </a:solidFill>
+          </a:ln>
+        </p:spPr>
+        <p:txBody>
+          <a:bodyPr wrap="none" rtlCol="0">
+            <a:spAutoFit/>
+          </a:bodyPr>
+          <a:lstStyle/>
+          <a:p>
+            <a:pPr algn="ctr"/>
+            <a:r>
+              <a:rPr lang="en-US" dirty="0" smtClean="0"/>
+              <a:t>Semantic Analysis</a:t>
+            </a:r>
+            <a:br>
+              <a:rPr lang="en-US" dirty="0" smtClean="0"/>
+            </a:br>
+            <a:r>
+              <a:rPr lang="en-US" dirty="0" smtClean="0"/>
+              <a:t>IR Code Generation</a:t>
+            </a:r>
+            <a:endParaRPr lang="en-US" dirty="0"/>
+          </a:p>
+        </p:txBody>
+      </p:sp>
+      <p:sp>
+        <p:nvSpPr>
+          <p:cNvPr id="12" name="TextBox 11"/>
+          <p:cNvSpPr txBox="1"/>
+          <p:nvPr/>
+        </p:nvSpPr>
+        <p:spPr>
+          <a:xfrm>
+            <a:off x="3686470" y="1997705"/>
+            <a:ext cx="1118027" cy="646331"/>
+          </a:xfrm>
+          <a:prstGeom prst="rect">
+            <a:avLst/>
+          </a:prstGeom>
+          <a:noFill/>
+          <a:ln>
+            <a:solidFill>
+              <a:srgbClr val="008000"/>
+            </a:solidFill>
+          </a:ln>
+        </p:spPr>
+        <p:txBody>
+          <a:bodyPr wrap="none" rtlCol="0">
+            <a:spAutoFit/>
+          </a:bodyPr>
+          <a:lstStyle/>
+          <a:p>
+            <a:pPr algn="ctr"/>
+            <a:r>
+              <a:rPr lang="en-US" dirty="0" err="1" smtClean="0"/>
+              <a:t>Cytron’s</a:t>
+            </a:r>
+            <a:r>
+              <a:rPr lang="en-US" dirty="0" smtClean="0"/>
+              <a:t> </a:t>
+            </a:r>
+            <a:br>
+              <a:rPr lang="en-US" dirty="0" smtClean="0"/>
+            </a:br>
+            <a:r>
+              <a:rPr lang="en-US" dirty="0" smtClean="0"/>
+              <a:t>Algorithm</a:t>
+            </a:r>
+            <a:endParaRPr lang="en-US" dirty="0"/>
+          </a:p>
+        </p:txBody>
+      </p:sp>
+      <p:sp>
+        <p:nvSpPr>
+          <p:cNvPr id="13" name="TextBox 12"/>
+          <p:cNvSpPr txBox="1"/>
+          <p:nvPr/>
+        </p:nvSpPr>
+        <p:spPr>
+          <a:xfrm>
+            <a:off x="5593173" y="1980127"/>
+            <a:ext cx="2242884" cy="646331"/>
+          </a:xfrm>
+          <a:prstGeom prst="rect">
+            <a:avLst/>
+          </a:prstGeom>
+          <a:noFill/>
+          <a:ln>
+            <a:solidFill>
+              <a:srgbClr val="008000"/>
+            </a:solidFill>
+          </a:ln>
+        </p:spPr>
+        <p:txBody>
+          <a:bodyPr wrap="none" rtlCol="0">
+            <a:spAutoFit/>
+          </a:bodyPr>
+          <a:lstStyle/>
+          <a:p>
+            <a:pPr algn="ctr"/>
+            <a:r>
+              <a:rPr lang="en-US" dirty="0"/>
+              <a:t>C</a:t>
+            </a:r>
+            <a:r>
+              <a:rPr lang="en-US" dirty="0" smtClean="0"/>
+              <a:t>onditional </a:t>
+            </a:r>
+            <a:r>
+              <a:rPr lang="en-US" dirty="0" err="1" smtClean="0"/>
+              <a:t>Φ</a:t>
+            </a:r>
+            <a:r>
+              <a:rPr lang="en-US" dirty="0" smtClean="0"/>
+              <a:t> -&gt; MUX</a:t>
+            </a:r>
+          </a:p>
+          <a:p>
+            <a:pPr algn="ctr"/>
+            <a:r>
+              <a:rPr lang="en-US" dirty="0" smtClean="0"/>
+              <a:t>Loop </a:t>
+            </a:r>
+            <a:r>
+              <a:rPr lang="en-US" dirty="0" err="1" smtClean="0"/>
+              <a:t>Φ</a:t>
+            </a:r>
+            <a:r>
+              <a:rPr lang="en-US" dirty="0" smtClean="0"/>
+              <a:t> -&gt; pseudo PHI</a:t>
+            </a:r>
+            <a:endParaRPr lang="en-US" dirty="0"/>
+          </a:p>
+        </p:txBody>
+      </p:sp>
+      <p:sp>
+        <p:nvSpPr>
+          <p:cNvPr id="14" name="TextBox 13"/>
+          <p:cNvSpPr txBox="1"/>
+          <p:nvPr/>
+        </p:nvSpPr>
+        <p:spPr>
+          <a:xfrm>
+            <a:off x="8089566" y="1426129"/>
+            <a:ext cx="2223836" cy="1200329"/>
+          </a:xfrm>
+          <a:prstGeom prst="rect">
+            <a:avLst/>
+          </a:prstGeom>
+          <a:noFill/>
+          <a:ln>
+            <a:solidFill>
+              <a:srgbClr val="008000"/>
+            </a:solidFill>
+          </a:ln>
+        </p:spPr>
+        <p:txBody>
+          <a:bodyPr wrap="none" rtlCol="0">
+            <a:spAutoFit/>
+          </a:bodyPr>
+          <a:lstStyle/>
+          <a:p>
+            <a:pPr algn="ctr"/>
+            <a:r>
+              <a:rPr lang="en-US" b="1" dirty="0" smtClean="0"/>
+              <a:t>Dependence Analysis</a:t>
+            </a:r>
+            <a:br>
+              <a:rPr lang="en-US" b="1" dirty="0" smtClean="0"/>
+            </a:br>
+            <a:r>
+              <a:rPr lang="en-US" b="1" dirty="0" smtClean="0"/>
+              <a:t>Taint Analysis</a:t>
+            </a:r>
+          </a:p>
+          <a:p>
+            <a:pPr algn="ctr"/>
+            <a:r>
+              <a:rPr lang="en-US" b="1" dirty="0" err="1" smtClean="0"/>
+              <a:t>Vectorization</a:t>
+            </a:r>
+            <a:endParaRPr lang="en-US" b="1" dirty="0" smtClean="0"/>
+          </a:p>
+          <a:p>
+            <a:pPr algn="ctr"/>
+            <a:r>
+              <a:rPr lang="en-US" b="1" dirty="0" smtClean="0"/>
+              <a:t>Future (e.g., mixing)</a:t>
+            </a:r>
+            <a:endParaRPr lang="en-US" b="1" dirty="0" smtClean="0"/>
+          </a:p>
+        </p:txBody>
+      </p:sp>
+      <p:sp>
+        <p:nvSpPr>
+          <p:cNvPr id="15" name="TextBox 14"/>
+          <p:cNvSpPr txBox="1"/>
+          <p:nvPr/>
+        </p:nvSpPr>
+        <p:spPr>
+          <a:xfrm>
+            <a:off x="10828599" y="2254420"/>
+            <a:ext cx="2433591" cy="369332"/>
+          </a:xfrm>
+          <a:prstGeom prst="rect">
+            <a:avLst/>
+          </a:prstGeom>
+          <a:noFill/>
+          <a:ln>
+            <a:solidFill>
+              <a:srgbClr val="008000"/>
+            </a:solidFill>
+          </a:ln>
+        </p:spPr>
+        <p:txBody>
+          <a:bodyPr wrap="none" rtlCol="0">
+            <a:spAutoFit/>
+          </a:bodyPr>
+          <a:lstStyle/>
+          <a:p>
+            <a:pPr algn="ctr"/>
+            <a:r>
+              <a:rPr lang="en-US" dirty="0" smtClean="0"/>
+              <a:t>Target Code Generation</a:t>
+            </a:r>
+            <a:endParaRPr lang="en-US" dirty="0"/>
+          </a:p>
+        </p:txBody>
+      </p:sp>
+      <p:cxnSp>
+        <p:nvCxnSpPr>
+          <p:cNvPr id="17" name="Straight Arrow Connector 16"/>
+          <p:cNvCxnSpPr>
+            <a:stCxn id="4" idx="3"/>
+            <a:endCxn id="5" idx="1"/>
+          </p:cNvCxnSpPr>
+          <p:nvPr/>
+        </p:nvCxnSpPr>
+        <p:spPr>
+          <a:xfrm>
+            <a:off x="1173429" y="3189125"/>
+            <a:ext cx="1037551" cy="534"/>
+          </a:xfrm>
+          <a:prstGeom prst="straightConnector1">
+            <a:avLst/>
+          </a:prstGeom>
+          <a:ln>
+            <a:tailEnd type="arrow"/>
+          </a:ln>
+        </p:spPr>
+        <p:style>
+          <a:lnRef idx="2">
+            <a:schemeClr val="accent1"/>
+          </a:lnRef>
+          <a:fillRef idx="0">
+            <a:schemeClr val="accent1"/>
+          </a:fillRef>
+          <a:effectRef idx="1">
+            <a:schemeClr val="accent1"/>
+          </a:effectRef>
+          <a:fontRef idx="minor">
+            <a:schemeClr val="tx1"/>
+          </a:fontRef>
+        </p:style>
+      </p:cxnSp>
+      <p:cxnSp>
+        <p:nvCxnSpPr>
+          <p:cNvPr id="19" name="Straight Arrow Connector 18"/>
+          <p:cNvCxnSpPr>
+            <a:stCxn id="5" idx="3"/>
+            <a:endCxn id="6" idx="1"/>
+          </p:cNvCxnSpPr>
+          <p:nvPr/>
+        </p:nvCxnSpPr>
+        <p:spPr>
+          <a:xfrm>
+            <a:off x="3739275" y="3189659"/>
+            <a:ext cx="1108460" cy="0"/>
+          </a:xfrm>
+          <a:prstGeom prst="straightConnector1">
+            <a:avLst/>
+          </a:prstGeom>
+          <a:ln>
+            <a:tailEnd type="arrow"/>
+          </a:ln>
+        </p:spPr>
+        <p:style>
+          <a:lnRef idx="2">
+            <a:schemeClr val="accent1"/>
+          </a:lnRef>
+          <a:fillRef idx="0">
+            <a:schemeClr val="accent1"/>
+          </a:fillRef>
+          <a:effectRef idx="1">
+            <a:schemeClr val="accent1"/>
+          </a:effectRef>
+          <a:fontRef idx="minor">
+            <a:schemeClr val="tx1"/>
+          </a:fontRef>
+        </p:style>
+      </p:cxnSp>
+      <p:cxnSp>
+        <p:nvCxnSpPr>
+          <p:cNvPr id="21" name="Straight Arrow Connector 20"/>
+          <p:cNvCxnSpPr>
+            <a:stCxn id="6" idx="3"/>
+            <a:endCxn id="7" idx="1"/>
+          </p:cNvCxnSpPr>
+          <p:nvPr/>
+        </p:nvCxnSpPr>
+        <p:spPr>
+          <a:xfrm>
+            <a:off x="5922932" y="3189659"/>
+            <a:ext cx="1313613" cy="534"/>
+          </a:xfrm>
+          <a:prstGeom prst="straightConnector1">
+            <a:avLst/>
+          </a:prstGeom>
+          <a:ln>
+            <a:tailEnd type="arrow"/>
+          </a:ln>
+        </p:spPr>
+        <p:style>
+          <a:lnRef idx="2">
+            <a:schemeClr val="accent1"/>
+          </a:lnRef>
+          <a:fillRef idx="0">
+            <a:schemeClr val="accent1"/>
+          </a:fillRef>
+          <a:effectRef idx="1">
+            <a:schemeClr val="accent1"/>
+          </a:effectRef>
+          <a:fontRef idx="minor">
+            <a:schemeClr val="tx1"/>
+          </a:fontRef>
+        </p:style>
+      </p:cxnSp>
+      <p:cxnSp>
+        <p:nvCxnSpPr>
+          <p:cNvPr id="23" name="Straight Arrow Connector 22"/>
+          <p:cNvCxnSpPr>
+            <a:stCxn id="8" idx="3"/>
+            <a:endCxn id="9" idx="1"/>
+          </p:cNvCxnSpPr>
+          <p:nvPr/>
+        </p:nvCxnSpPr>
+        <p:spPr>
+          <a:xfrm>
+            <a:off x="8567394" y="3194704"/>
+            <a:ext cx="1277893" cy="14780"/>
+          </a:xfrm>
+          <a:prstGeom prst="straightConnector1">
+            <a:avLst/>
+          </a:prstGeom>
+          <a:ln>
+            <a:tailEnd type="arrow"/>
+          </a:ln>
+        </p:spPr>
+        <p:style>
+          <a:lnRef idx="2">
+            <a:schemeClr val="accent1"/>
+          </a:lnRef>
+          <a:fillRef idx="0">
+            <a:schemeClr val="accent1"/>
+          </a:fillRef>
+          <a:effectRef idx="1">
+            <a:schemeClr val="accent1"/>
+          </a:effectRef>
+          <a:fontRef idx="minor">
+            <a:schemeClr val="tx1"/>
+          </a:fontRef>
+        </p:style>
+      </p:cxnSp>
+      <p:cxnSp>
+        <p:nvCxnSpPr>
+          <p:cNvPr id="25" name="Straight Arrow Connector 24"/>
+          <p:cNvCxnSpPr>
+            <a:stCxn id="9" idx="3"/>
+            <a:endCxn id="10" idx="1"/>
+          </p:cNvCxnSpPr>
+          <p:nvPr/>
+        </p:nvCxnSpPr>
+        <p:spPr>
+          <a:xfrm>
+            <a:off x="11184115" y="3209484"/>
+            <a:ext cx="1598521" cy="94"/>
+          </a:xfrm>
+          <a:prstGeom prst="straightConnector1">
+            <a:avLst/>
+          </a:prstGeom>
+          <a:ln>
+            <a:tailEnd type="arrow"/>
+          </a:ln>
+        </p:spPr>
+        <p:style>
+          <a:lnRef idx="2">
+            <a:schemeClr val="accent1"/>
+          </a:lnRef>
+          <a:fillRef idx="0">
+            <a:schemeClr val="accent1"/>
+          </a:fillRef>
+          <a:effectRef idx="1">
+            <a:schemeClr val="accent1"/>
+          </a:effectRef>
+          <a:fontRef idx="minor">
+            <a:schemeClr val="tx1"/>
+          </a:fontRef>
+        </p:style>
+      </p:cxnSp>
+      <p:sp>
+        <p:nvSpPr>
+          <p:cNvPr id="28" name="Down Arrow 27"/>
+          <p:cNvSpPr/>
+          <p:nvPr/>
+        </p:nvSpPr>
+        <p:spPr>
+          <a:xfrm>
+            <a:off x="1505814" y="2680261"/>
+            <a:ext cx="385453" cy="386560"/>
+          </a:xfrm>
+          <a:prstGeom prst="downArrow">
+            <a:avLst/>
+          </a:prstGeom>
+        </p:spPr>
+        <p:style>
+          <a:lnRef idx="1">
+            <a:schemeClr val="accent1"/>
+          </a:lnRef>
+          <a:fillRef idx="3">
+            <a:schemeClr val="accent1"/>
+          </a:fillRef>
+          <a:effectRef idx="2">
+            <a:schemeClr val="accent1"/>
+          </a:effectRef>
+          <a:fontRef idx="minor">
+            <a:schemeClr val="lt1"/>
+          </a:fontRef>
+        </p:style>
+        <p:txBody>
+          <a:bodyPr rtlCol="0" anchor="ctr"/>
+          <a:lstStyle/>
+          <a:p>
+            <a:pPr algn="ctr"/>
+            <a:endParaRPr lang="en-US"/>
+          </a:p>
+        </p:txBody>
+      </p:sp>
+      <p:sp>
+        <p:nvSpPr>
+          <p:cNvPr id="29" name="Down Arrow 28"/>
+          <p:cNvSpPr/>
+          <p:nvPr/>
+        </p:nvSpPr>
+        <p:spPr>
+          <a:xfrm>
+            <a:off x="4057233" y="2708407"/>
+            <a:ext cx="385453" cy="386560"/>
+          </a:xfrm>
+          <a:prstGeom prst="downArrow">
+            <a:avLst/>
+          </a:prstGeom>
+        </p:spPr>
+        <p:style>
+          <a:lnRef idx="1">
+            <a:schemeClr val="accent1"/>
+          </a:lnRef>
+          <a:fillRef idx="3">
+            <a:schemeClr val="accent1"/>
+          </a:fillRef>
+          <a:effectRef idx="2">
+            <a:schemeClr val="accent1"/>
+          </a:effectRef>
+          <a:fontRef idx="minor">
+            <a:schemeClr val="lt1"/>
+          </a:fontRef>
+        </p:style>
+        <p:txBody>
+          <a:bodyPr rtlCol="0" anchor="ctr"/>
+          <a:lstStyle/>
+          <a:p>
+            <a:pPr algn="ctr"/>
+            <a:endParaRPr lang="en-US"/>
+          </a:p>
+        </p:txBody>
+      </p:sp>
+      <p:sp>
+        <p:nvSpPr>
+          <p:cNvPr id="30" name="Down Arrow 29"/>
+          <p:cNvSpPr/>
+          <p:nvPr/>
+        </p:nvSpPr>
+        <p:spPr>
+          <a:xfrm>
+            <a:off x="6463214" y="2708407"/>
+            <a:ext cx="385453" cy="386560"/>
+          </a:xfrm>
+          <a:prstGeom prst="downArrow">
+            <a:avLst/>
+          </a:prstGeom>
+        </p:spPr>
+        <p:style>
+          <a:lnRef idx="1">
+            <a:schemeClr val="accent1"/>
+          </a:lnRef>
+          <a:fillRef idx="3">
+            <a:schemeClr val="accent1"/>
+          </a:fillRef>
+          <a:effectRef idx="2">
+            <a:schemeClr val="accent1"/>
+          </a:effectRef>
+          <a:fontRef idx="minor">
+            <a:schemeClr val="lt1"/>
+          </a:fontRef>
+        </p:style>
+        <p:txBody>
+          <a:bodyPr rtlCol="0" anchor="ctr"/>
+          <a:lstStyle/>
+          <a:p>
+            <a:pPr algn="ctr"/>
+            <a:endParaRPr lang="en-US"/>
+          </a:p>
+        </p:txBody>
+      </p:sp>
+      <p:sp>
+        <p:nvSpPr>
+          <p:cNvPr id="31" name="Down Arrow 30"/>
+          <p:cNvSpPr/>
+          <p:nvPr/>
+        </p:nvSpPr>
+        <p:spPr>
+          <a:xfrm>
+            <a:off x="9038498" y="2693038"/>
+            <a:ext cx="385453" cy="386560"/>
+          </a:xfrm>
+          <a:prstGeom prst="downArrow">
+            <a:avLst/>
+          </a:prstGeom>
+        </p:spPr>
+        <p:style>
+          <a:lnRef idx="1">
+            <a:schemeClr val="accent1"/>
+          </a:lnRef>
+          <a:fillRef idx="3">
+            <a:schemeClr val="accent1"/>
+          </a:fillRef>
+          <a:effectRef idx="2">
+            <a:schemeClr val="accent1"/>
+          </a:effectRef>
+          <a:fontRef idx="minor">
+            <a:schemeClr val="lt1"/>
+          </a:fontRef>
+        </p:style>
+        <p:txBody>
+          <a:bodyPr rtlCol="0" anchor="ctr"/>
+          <a:lstStyle/>
+          <a:p>
+            <a:pPr algn="ctr"/>
+            <a:endParaRPr lang="en-US"/>
+          </a:p>
+        </p:txBody>
+      </p:sp>
+      <p:sp>
+        <p:nvSpPr>
+          <p:cNvPr id="32" name="Down Arrow 31"/>
+          <p:cNvSpPr/>
+          <p:nvPr/>
+        </p:nvSpPr>
+        <p:spPr>
+          <a:xfrm>
+            <a:off x="11866992" y="2693038"/>
+            <a:ext cx="385453" cy="386560"/>
+          </a:xfrm>
+          <a:prstGeom prst="downArrow">
+            <a:avLst/>
+          </a:prstGeom>
+        </p:spPr>
+        <p:style>
+          <a:lnRef idx="1">
+            <a:schemeClr val="accent1"/>
+          </a:lnRef>
+          <a:fillRef idx="3">
+            <a:schemeClr val="accent1"/>
+          </a:fillRef>
+          <a:effectRef idx="2">
+            <a:schemeClr val="accent1"/>
+          </a:effectRef>
+          <a:fontRef idx="minor">
+            <a:schemeClr val="lt1"/>
+          </a:fontRef>
+        </p:style>
+        <p:txBody>
+          <a:bodyPr rtlCol="0" anchor="ctr"/>
+          <a:lstStyle/>
+          <a:p>
+            <a:pPr algn="ctr"/>
+            <a:endParaRPr lang="en-US"/>
+          </a:p>
+        </p:txBody>
+      </p:sp>
+      <p:sp>
+        <p:nvSpPr>
+          <p:cNvPr id="2" name="Oval 1"/>
+          <p:cNvSpPr/>
+          <p:nvPr/>
+        </p:nvSpPr>
+        <p:spPr>
+          <a:xfrm>
+            <a:off x="6763041" y="1070169"/>
+            <a:ext cx="5018325" cy="2980410"/>
+          </a:xfrm>
+          <a:prstGeom prst="ellipse">
+            <a:avLst/>
+          </a:prstGeom>
+          <a:noFill/>
+          <a:ln w="25400">
+            <a:solidFill>
+              <a:srgbClr val="FF0000"/>
+            </a:solidFill>
+          </a:ln>
+        </p:spPr>
+        <p:style>
+          <a:lnRef idx="1">
+            <a:schemeClr val="accent1"/>
+          </a:lnRef>
+          <a:fillRef idx="3">
+            <a:schemeClr val="accent1"/>
+          </a:fillRef>
+          <a:effectRef idx="2">
+            <a:schemeClr val="accent1"/>
+          </a:effectRef>
+          <a:fontRef idx="minor">
+            <a:schemeClr val="lt1"/>
+          </a:fontRef>
+        </p:style>
+        <p:txBody>
+          <a:bodyPr rtlCol="0" anchor="ctr"/>
+          <a:lstStyle/>
+          <a:p>
+            <a:pPr algn="ctr"/>
+            <a:endParaRPr lang="en-US" dirty="0" smtClean="0"/>
+          </a:p>
+          <a:p>
+            <a:pPr algn="ctr"/>
+            <a:endParaRPr lang="en-US" dirty="0"/>
+          </a:p>
+        </p:txBody>
+      </p:sp>
+    </p:spTree>
+    <p:extLst>
+      <p:ext uri="{BB962C8B-B14F-4D97-AF65-F5344CB8AC3E}">
+        <p14:creationId xmlns:p14="http://schemas.microsoft.com/office/powerpoint/2010/main" val="217210803"/>
+      </p:ext>
+    </p:extLst>
+  </p:cSld>
+  <p:clrMapOvr>
+    <a:masterClrMapping/>
+  </p:clrMapOvr>
+</p:sld>
+</file>
+
+<file path=ppt/slides/slide4.xml><?xml version="1.0" encoding="utf-8"?>
+<p:sld xmlns:a="http://schemas.openxmlformats.org/drawingml/2006/main" xmlns:r="http://schemas.openxmlformats.org/officeDocument/2006/relationships" xmlns:p="http://schemas.openxmlformats.org/presentationml/2006/main">
+  <p:cSld>
+    <p:spTree>
+      <p:nvGrpSpPr>
+        <p:cNvPr id="1" name=""/>
+        <p:cNvGrpSpPr/>
+        <p:nvPr/>
+      </p:nvGrpSpPr>
+      <p:grpSpPr>
+        <a:xfrm>
+          <a:off x="0" y="0"/>
+          <a:ext cx="0" cy="0"/>
+          <a:chOff x="0" y="0"/>
+          <a:chExt cx="0" cy="0"/>
+        </a:xfrm>
+      </p:grpSpPr>
+      <p:sp>
+        <p:nvSpPr>
+          <p:cNvPr id="4" name="TextBox 3"/>
+          <p:cNvSpPr txBox="1"/>
+          <p:nvPr/>
+        </p:nvSpPr>
+        <p:spPr>
+          <a:xfrm>
             <a:off x="911121" y="1049236"/>
             <a:ext cx="823400" cy="369332"/>
           </a:xfrm>
@@ -4987,7 +5936,7 @@
 </p:sld>
 </file>
 
-<file path=ppt/slides/slide4.xml><?xml version="1.0" encoding="utf-8"?>
+<file path=ppt/slides/slide5.xml><?xml version="1.0" encoding="utf-8"?>
 <p:sld xmlns:a="http://schemas.openxmlformats.org/drawingml/2006/main" xmlns:r="http://schemas.openxmlformats.org/officeDocument/2006/relationships" xmlns:p="http://schemas.openxmlformats.org/presentationml/2006/main">
   <p:cSld>
     <p:spTree>
@@ -5718,11 +6667,7 @@
             <a:pPr algn="ctr"/>
             <a:r>
               <a:rPr lang="en-US" dirty="0" smtClean="0"/>
-              <a:t>???</a:t>
-            </a:r>
-            <a:r>
-              <a:rPr lang="en-US" dirty="0" smtClean="0"/>
-              <a:t> </a:t>
+              <a:t>??? </a:t>
             </a:r>
             <a:br>
               <a:rPr lang="en-US" dirty="0" smtClean="0"/>
@@ -5803,10 +6748,6 @@
               <a:rPr lang="en-US" dirty="0" smtClean="0"/>
               <a:t>SPDZ</a:t>
             </a:r>
-            <a:r>
-              <a:rPr lang="en-US" dirty="0" smtClean="0"/>
-              <a:t/>
-            </a:r>
             <a:br>
               <a:rPr lang="en-US" dirty="0" smtClean="0"/>
             </a:br>
@@ -5885,10 +6826,6 @@
             <a:r>
               <a:rPr lang="en-US" dirty="0" smtClean="0"/>
               <a:t>???</a:t>
-            </a:r>
-            <a:r>
-              <a:rPr lang="en-US" dirty="0" smtClean="0"/>
-              <a:t/>
             </a:r>
             <a:br>
               <a:rPr lang="en-US" dirty="0" smtClean="0"/>

</xml_diff>